<commit_message>
Se actualiza el contenido de la clase 2
</commit_message>
<xml_diff>
--- a/clase-2/UNI-Curso-Analisis-Datos-Clase-2.pptx
+++ b/clase-2/UNI-Curso-Analisis-Datos-Clase-2.pptx
@@ -5,7 +5,7 @@
     <p:sldMasterId id="2147483818" r:id="rId1"/>
   </p:sldMasterIdLst>
   <p:notesMasterIdLst>
-    <p:notesMasterId r:id="rId12"/>
+    <p:notesMasterId r:id="rId13"/>
   </p:notesMasterIdLst>
   <p:sldIdLst>
     <p:sldId id="256" r:id="rId2"/>
@@ -13,11 +13,12 @@
     <p:sldId id="258" r:id="rId4"/>
     <p:sldId id="290" r:id="rId5"/>
     <p:sldId id="291" r:id="rId6"/>
-    <p:sldId id="293" r:id="rId7"/>
-    <p:sldId id="294" r:id="rId8"/>
-    <p:sldId id="295" r:id="rId9"/>
-    <p:sldId id="297" r:id="rId10"/>
-    <p:sldId id="296" r:id="rId11"/>
+    <p:sldId id="298" r:id="rId7"/>
+    <p:sldId id="293" r:id="rId8"/>
+    <p:sldId id="294" r:id="rId9"/>
+    <p:sldId id="295" r:id="rId10"/>
+    <p:sldId id="297" r:id="rId11"/>
+    <p:sldId id="296" r:id="rId12"/>
   </p:sldIdLst>
   <p:sldSz cx="12192000" cy="6858000"/>
   <p:notesSz cx="6858000" cy="9144000"/>
@@ -206,7 +207,7 @@
           <a:p>
             <a:fld id="{79E689E1-7436-0346-971B-E082364B4155}" type="datetimeFigureOut">
               <a:rPr lang="en-US" smtClean="0"/>
-              <a:t>12/19/18</a:t>
+              <a:t>1/16/19</a:t>
             </a:fld>
             <a:endParaRPr lang="en-US"/>
           </a:p>
@@ -707,7 +708,7 @@
           <a:p>
             <a:fld id="{DA40CE96-421D-5646-938B-946C06D75178}" type="slidenum">
               <a:rPr lang="en-US" smtClean="0"/>
-              <a:t>6</a:t>
+              <a:t>4</a:t>
             </a:fld>
             <a:endParaRPr lang="en-US"/>
           </a:p>
@@ -716,7 +717,7 @@
     </p:spTree>
     <p:extLst>
       <p:ext uri="{BB962C8B-B14F-4D97-AF65-F5344CB8AC3E}">
-        <p14:creationId xmlns:p14="http://schemas.microsoft.com/office/powerpoint/2010/main" val="1180164928"/>
+        <p14:creationId xmlns:p14="http://schemas.microsoft.com/office/powerpoint/2010/main" val="988294577"/>
       </p:ext>
     </p:extLst>
   </p:cSld>
@@ -800,7 +801,7 @@
     </p:spTree>
     <p:extLst>
       <p:ext uri="{BB962C8B-B14F-4D97-AF65-F5344CB8AC3E}">
-        <p14:creationId xmlns:p14="http://schemas.microsoft.com/office/powerpoint/2010/main" val="69687841"/>
+        <p14:creationId xmlns:p14="http://schemas.microsoft.com/office/powerpoint/2010/main" val="1180164928"/>
       </p:ext>
     </p:extLst>
   </p:cSld>
@@ -884,7 +885,7 @@
     </p:spTree>
     <p:extLst>
       <p:ext uri="{BB962C8B-B14F-4D97-AF65-F5344CB8AC3E}">
-        <p14:creationId xmlns:p14="http://schemas.microsoft.com/office/powerpoint/2010/main" val="142800401"/>
+        <p14:creationId xmlns:p14="http://schemas.microsoft.com/office/powerpoint/2010/main" val="69687841"/>
       </p:ext>
     </p:extLst>
   </p:cSld>
@@ -968,7 +969,7 @@
     </p:spTree>
     <p:extLst>
       <p:ext uri="{BB962C8B-B14F-4D97-AF65-F5344CB8AC3E}">
-        <p14:creationId xmlns:p14="http://schemas.microsoft.com/office/powerpoint/2010/main" val="1132467945"/>
+        <p14:creationId xmlns:p14="http://schemas.microsoft.com/office/powerpoint/2010/main" val="142800401"/>
       </p:ext>
     </p:extLst>
   </p:cSld>
@@ -1044,6 +1045,90 @@
             <a:fld id="{DA40CE96-421D-5646-938B-946C06D75178}" type="slidenum">
               <a:rPr lang="en-US" smtClean="0"/>
               <a:t>10</a:t>
+            </a:fld>
+            <a:endParaRPr lang="en-US"/>
+          </a:p>
+        </p:txBody>
+      </p:sp>
+    </p:spTree>
+    <p:extLst>
+      <p:ext uri="{BB962C8B-B14F-4D97-AF65-F5344CB8AC3E}">
+        <p14:creationId xmlns:p14="http://schemas.microsoft.com/office/powerpoint/2010/main" val="1132467945"/>
+      </p:ext>
+    </p:extLst>
+  </p:cSld>
+  <p:clrMapOvr>
+    <a:masterClrMapping/>
+  </p:clrMapOvr>
+</p:notes>
+</file>
+
+<file path=ppt/notesSlides/notesSlide8.xml><?xml version="1.0" encoding="utf-8"?>
+<p:notes xmlns:a="http://schemas.openxmlformats.org/drawingml/2006/main" xmlns:r="http://schemas.openxmlformats.org/officeDocument/2006/relationships" xmlns:p="http://schemas.openxmlformats.org/presentationml/2006/main">
+  <p:cSld>
+    <p:spTree>
+      <p:nvGrpSpPr>
+        <p:cNvPr id="1" name=""/>
+        <p:cNvGrpSpPr/>
+        <p:nvPr/>
+      </p:nvGrpSpPr>
+      <p:grpSpPr>
+        <a:xfrm>
+          <a:off x="0" y="0"/>
+          <a:ext cx="0" cy="0"/>
+          <a:chOff x="0" y="0"/>
+          <a:chExt cx="0" cy="0"/>
+        </a:xfrm>
+      </p:grpSpPr>
+      <p:sp>
+        <p:nvSpPr>
+          <p:cNvPr id="2" name="Marcador de imagen de diapositiva 1"/>
+          <p:cNvSpPr>
+            <a:spLocks noGrp="1" noRot="1" noChangeAspect="1"/>
+          </p:cNvSpPr>
+          <p:nvPr>
+            <p:ph type="sldImg"/>
+          </p:nvPr>
+        </p:nvSpPr>
+        <p:spPr/>
+      </p:sp>
+      <p:sp>
+        <p:nvSpPr>
+          <p:cNvPr id="3" name="Marcador de notas 2"/>
+          <p:cNvSpPr>
+            <a:spLocks noGrp="1"/>
+          </p:cNvSpPr>
+          <p:nvPr>
+            <p:ph type="body" idx="1"/>
+          </p:nvPr>
+        </p:nvSpPr>
+        <p:spPr/>
+        <p:txBody>
+          <a:bodyPr/>
+          <a:lstStyle/>
+          <a:p>
+            <a:endParaRPr lang="en-US" dirty="0"/>
+          </a:p>
+        </p:txBody>
+      </p:sp>
+      <p:sp>
+        <p:nvSpPr>
+          <p:cNvPr id="4" name="Marcador de número de diapositiva 3"/>
+          <p:cNvSpPr>
+            <a:spLocks noGrp="1"/>
+          </p:cNvSpPr>
+          <p:nvPr>
+            <p:ph type="sldNum" sz="quarter" idx="10"/>
+          </p:nvPr>
+        </p:nvSpPr>
+        <p:spPr/>
+        <p:txBody>
+          <a:bodyPr/>
+          <a:lstStyle/>
+          <a:p>
+            <a:fld id="{DA40CE96-421D-5646-938B-946C06D75178}" type="slidenum">
+              <a:rPr lang="en-US" smtClean="0"/>
+              <a:t>11</a:t>
             </a:fld>
             <a:endParaRPr lang="en-US"/>
           </a:p>
@@ -1564,7 +1649,7 @@
           <a:p>
             <a:fld id="{78ABE3C1-DBE1-495D-B57B-2849774B866A}" type="datetimeFigureOut">
               <a:rPr lang="en-US" smtClean="0"/>
-              <a:t>12/19/18</a:t>
+              <a:t>1/16/19</a:t>
             </a:fld>
             <a:endParaRPr lang="en-US" dirty="0"/>
           </a:p>
@@ -1860,7 +1945,7 @@
           <a:p>
             <a:fld id="{9D6E9DEC-419B-4CC5-A080-3B06BD5A8291}" type="datetimeFigureOut">
               <a:rPr lang="en-US" smtClean="0"/>
-              <a:t>12/19/18</a:t>
+              <a:t>1/16/19</a:t>
             </a:fld>
             <a:endParaRPr lang="en-US" dirty="0"/>
           </a:p>
@@ -2110,7 +2195,7 @@
           <a:p>
             <a:fld id="{9D6E9DEC-419B-4CC5-A080-3B06BD5A8291}" type="datetimeFigureOut">
               <a:rPr lang="en-US" smtClean="0"/>
-              <a:t>12/19/18</a:t>
+              <a:t>1/16/19</a:t>
             </a:fld>
             <a:endParaRPr lang="en-US" dirty="0"/>
           </a:p>
@@ -2652,7 +2737,7 @@
           <a:p>
             <a:fld id="{9D6E9DEC-419B-4CC5-A080-3B06BD5A8291}" type="datetimeFigureOut">
               <a:rPr lang="en-US" smtClean="0"/>
-              <a:t>12/19/18</a:t>
+              <a:t>1/16/19</a:t>
             </a:fld>
             <a:endParaRPr lang="en-US" dirty="0"/>
           </a:p>
@@ -2902,7 +2987,7 @@
           <a:p>
             <a:fld id="{9D6E9DEC-419B-4CC5-A080-3B06BD5A8291}" type="datetimeFigureOut">
               <a:rPr lang="en-US" smtClean="0"/>
-              <a:t>12/19/18</a:t>
+              <a:t>1/16/19</a:t>
             </a:fld>
             <a:endParaRPr lang="en-US" dirty="0"/>
           </a:p>
@@ -3436,7 +3521,7 @@
           <a:p>
             <a:fld id="{9D6E9DEC-419B-4CC5-A080-3B06BD5A8291}" type="datetimeFigureOut">
               <a:rPr lang="en-US" smtClean="0"/>
-              <a:t>12/19/18</a:t>
+              <a:t>1/16/19</a:t>
             </a:fld>
             <a:endParaRPr lang="en-US" dirty="0"/>
           </a:p>
@@ -3735,7 +3820,7 @@
           <a:p>
             <a:fld id="{9D6E9DEC-419B-4CC5-A080-3B06BD5A8291}" type="datetimeFigureOut">
               <a:rPr lang="en-US" smtClean="0"/>
-              <a:t>12/19/18</a:t>
+              <a:t>1/16/19</a:t>
             </a:fld>
             <a:endParaRPr lang="en-US" dirty="0"/>
           </a:p>
@@ -3911,7 +3996,7 @@
           <a:p>
             <a:fld id="{1FA3F48C-C7C6-4055-9F49-3777875E72AE}" type="datetimeFigureOut">
               <a:rPr lang="en-US" smtClean="0"/>
-              <a:t>12/19/18</a:t>
+              <a:t>1/16/19</a:t>
             </a:fld>
             <a:endParaRPr lang="en-US" dirty="0"/>
           </a:p>
@@ -4091,7 +4176,7 @@
           <a:p>
             <a:fld id="{6178E61D-D431-422C-9764-11DAFE33AB63}" type="datetimeFigureOut">
               <a:rPr lang="en-US" smtClean="0"/>
-              <a:t>12/19/18</a:t>
+              <a:t>1/16/19</a:t>
             </a:fld>
             <a:endParaRPr lang="en-US" dirty="0"/>
           </a:p>
@@ -4262,7 +4347,7 @@
           <a:p>
             <a:fld id="{12DE42F4-6EEF-4EF7-8ED4-2208F0F89A08}" type="datetimeFigureOut">
               <a:rPr lang="en-US" smtClean="0"/>
-              <a:t>12/19/18</a:t>
+              <a:t>1/16/19</a:t>
             </a:fld>
             <a:endParaRPr lang="en-US" dirty="0"/>
           </a:p>
@@ -4513,7 +4598,7 @@
           <a:p>
             <a:fld id="{30578ACC-22D6-47C1-A373-4FD133E34F3C}" type="datetimeFigureOut">
               <a:rPr lang="en-US" smtClean="0"/>
-              <a:t>12/19/18</a:t>
+              <a:t>1/16/19</a:t>
             </a:fld>
             <a:endParaRPr lang="en-US" dirty="0"/>
           </a:p>
@@ -4810,7 +4895,7 @@
           <a:p>
             <a:fld id="{4E5A6C69-6797-4E8A-BF37-F2C3751466E9}" type="datetimeFigureOut">
               <a:rPr lang="en-US" smtClean="0"/>
-              <a:t>12/19/18</a:t>
+              <a:t>1/16/19</a:t>
             </a:fld>
             <a:endParaRPr lang="en-US" dirty="0"/>
           </a:p>
@@ -5252,7 +5337,7 @@
           <a:p>
             <a:fld id="{D82014A1-A632-4878-A0D3-F52BA7563730}" type="datetimeFigureOut">
               <a:rPr lang="en-US" smtClean="0"/>
-              <a:t>12/19/18</a:t>
+              <a:t>1/16/19</a:t>
             </a:fld>
             <a:endParaRPr lang="en-US" dirty="0"/>
           </a:p>
@@ -5370,7 +5455,7 @@
           <a:p>
             <a:fld id="{CE99F462-093F-4566-844B-4C71F2739DA5}" type="datetimeFigureOut">
               <a:rPr lang="en-US" smtClean="0"/>
-              <a:t>12/19/18</a:t>
+              <a:t>1/16/19</a:t>
             </a:fld>
             <a:endParaRPr lang="en-US" dirty="0"/>
           </a:p>
@@ -5465,7 +5550,7 @@
           <a:p>
             <a:fld id="{3D24A7AC-904D-4781-85BA-7D10C17ED021}" type="datetimeFigureOut">
               <a:rPr lang="en-US" smtClean="0"/>
-              <a:t>12/19/18</a:t>
+              <a:t>1/16/19</a:t>
             </a:fld>
             <a:endParaRPr lang="en-US" dirty="0"/>
           </a:p>
@@ -5748,7 +5833,7 @@
           <a:p>
             <a:fld id="{E331444B-B92B-4E27-8C94-BB93EAF5CB18}" type="datetimeFigureOut">
               <a:rPr lang="en-US" smtClean="0"/>
-              <a:t>12/19/18</a:t>
+              <a:t>1/16/19</a:t>
             </a:fld>
             <a:endParaRPr lang="en-US" dirty="0"/>
           </a:p>
@@ -6039,7 +6124,7 @@
           <a:p>
             <a:fld id="{363EFA5E-FA76-400D-B3DC-F0BA90E6D107}" type="datetimeFigureOut">
               <a:rPr lang="en-US" smtClean="0"/>
-              <a:t>12/19/18</a:t>
+              <a:t>1/16/19</a:t>
             </a:fld>
             <a:endParaRPr lang="en-US" dirty="0"/>
           </a:p>
@@ -6569,7 +6654,7 @@
           <a:p>
             <a:fld id="{9D6E9DEC-419B-4CC5-A080-3B06BD5A8291}" type="datetimeFigureOut">
               <a:rPr lang="en-US" smtClean="0"/>
-              <a:t>12/19/18</a:t>
+              <a:t>1/16/19</a:t>
             </a:fld>
             <a:endParaRPr lang="en-US" dirty="0"/>
           </a:p>
@@ -7445,11 +7530,7 @@
             </a:r>
             <a:r>
               <a:rPr lang="en-US" dirty="0" smtClean="0"/>
-              <a:t> </a:t>
-            </a:r>
-            <a:r>
-              <a:rPr lang="en-US" dirty="0" smtClean="0"/>
-              <a:t>2</a:t>
+              <a:t> 2</a:t>
             </a:r>
             <a:endParaRPr lang="en-US" dirty="0"/>
           </a:p>
@@ -7515,6 +7596,102 @@
           <a:lstStyle/>
           <a:p>
             <a:r>
+              <a:rPr lang="es-ES_tradnl" dirty="0" smtClean="0"/>
+              <a:t>Ejercicio</a:t>
+            </a:r>
+            <a:endParaRPr lang="es-ES_tradnl" dirty="0"/>
+          </a:p>
+        </p:txBody>
+      </p:sp>
+      <p:pic>
+        <p:nvPicPr>
+          <p:cNvPr id="6" name="Marcador de contenido 5"/>
+          <p:cNvPicPr>
+            <a:picLocks noGrp="1" noChangeAspect="1"/>
+          </p:cNvPicPr>
+          <p:nvPr>
+            <p:ph idx="1"/>
+          </p:nvPr>
+        </p:nvPicPr>
+        <p:blipFill>
+          <a:blip r:embed="rId3">
+            <a:extLst>
+              <a:ext uri="{28A0092B-C50C-407E-A947-70E740481C1C}">
+                <a14:useLocalDpi xmlns:a14="http://schemas.microsoft.com/office/drawing/2010/main" val="0"/>
+              </a:ext>
+            </a:extLst>
+          </a:blip>
+          <a:stretch>
+            <a:fillRect/>
+          </a:stretch>
+        </p:blipFill>
+        <p:spPr>
+          <a:xfrm>
+            <a:off x="3259015" y="1630425"/>
+            <a:ext cx="6283569" cy="5048129"/>
+          </a:xfrm>
+        </p:spPr>
+      </p:pic>
+    </p:spTree>
+    <p:extLst>
+      <p:ext uri="{BB962C8B-B14F-4D97-AF65-F5344CB8AC3E}">
+        <p14:creationId xmlns:p14="http://schemas.microsoft.com/office/powerpoint/2010/main" val="1773686736"/>
+      </p:ext>
+    </p:extLst>
+  </p:cSld>
+  <p:clrMapOvr>
+    <a:masterClrMapping/>
+  </p:clrMapOvr>
+  <p:timing>
+    <p:tnLst>
+      <p:par>
+        <p:cTn id="1" dur="indefinite" restart="never" nodeType="tmRoot"/>
+      </p:par>
+    </p:tnLst>
+  </p:timing>
+</p:sld>
+</file>
+
+<file path=ppt/slides/slide11.xml><?xml version="1.0" encoding="utf-8"?>
+<p:sld xmlns:a="http://schemas.openxmlformats.org/drawingml/2006/main" xmlns:r="http://schemas.openxmlformats.org/officeDocument/2006/relationships" xmlns:p="http://schemas.openxmlformats.org/presentationml/2006/main">
+  <p:cSld>
+    <p:spTree>
+      <p:nvGrpSpPr>
+        <p:cNvPr id="1" name=""/>
+        <p:cNvGrpSpPr/>
+        <p:nvPr/>
+      </p:nvGrpSpPr>
+      <p:grpSpPr>
+        <a:xfrm>
+          <a:off x="0" y="0"/>
+          <a:ext cx="0" cy="0"/>
+          <a:chOff x="0" y="0"/>
+          <a:chExt cx="0" cy="0"/>
+        </a:xfrm>
+      </p:grpSpPr>
+      <p:sp>
+        <p:nvSpPr>
+          <p:cNvPr id="2" name="Título 1"/>
+          <p:cNvSpPr>
+            <a:spLocks noGrp="1"/>
+          </p:cNvSpPr>
+          <p:nvPr>
+            <p:ph type="title"/>
+          </p:nvPr>
+        </p:nvSpPr>
+        <p:spPr>
+          <a:xfrm>
+            <a:off x="1484311" y="685801"/>
+            <a:ext cx="10018713" cy="814754"/>
+          </a:xfrm>
+        </p:spPr>
+        <p:txBody>
+          <a:bodyPr>
+            <a:normAutofit/>
+          </a:bodyPr>
+          <a:lstStyle/>
+          <a:p>
+            <a:r>
               <a:rPr lang="es-ES_tradnl" dirty="0" err="1" smtClean="0"/>
               <a:t>Kaggle</a:t>
             </a:r>
@@ -7756,7 +7933,25 @@
               <a:rPr lang="es-ES_tradnl" dirty="0" smtClean="0"/>
               <a:t>Repaso de ejercicios anteriores</a:t>
             </a:r>
-            <a:endParaRPr lang="es-ES_tradnl" dirty="0" smtClean="0"/>
+          </a:p>
+          <a:p>
+            <a:pPr lvl="1"/>
+            <a:r>
+              <a:rPr lang="es-ES_tradnl" dirty="0">
+                <a:hlinkClick r:id="rId3"/>
+              </a:rPr>
+              <a:t>https://</a:t>
+            </a:r>
+            <a:r>
+              <a:rPr lang="es-ES_tradnl" dirty="0" smtClean="0">
+                <a:hlinkClick r:id="rId3"/>
+              </a:rPr>
+              <a:t>github.com/mongaru/curso-analisis-datos-2018</a:t>
+            </a:r>
+            <a:r>
+              <a:rPr lang="es-ES_tradnl" dirty="0" smtClean="0"/>
+              <a:t>	</a:t>
+            </a:r>
           </a:p>
           <a:p>
             <a:r>
@@ -8109,18 +8304,10 @@
           <a:lstStyle/>
           <a:p>
             <a:r>
-              <a:rPr lang="en-US" dirty="0" err="1" smtClean="0"/>
-              <a:t>Exploracion</a:t>
-            </a:r>
-            <a:r>
-              <a:rPr lang="en-US" dirty="0" smtClean="0"/>
-              <a:t> de </a:t>
-            </a:r>
-            <a:r>
-              <a:rPr lang="en-US" dirty="0" err="1" smtClean="0"/>
-              <a:t>Datos</a:t>
-            </a:r>
-            <a:endParaRPr lang="en-US" dirty="0"/>
+              <a:rPr lang="es-ES_tradnl" dirty="0" smtClean="0"/>
+              <a:t>Exploración de Datos</a:t>
+            </a:r>
+            <a:endParaRPr lang="es-ES_tradnl" dirty="0"/>
           </a:p>
         </p:txBody>
       </p:sp>
@@ -8177,7 +8364,6 @@
               <a:rPr lang="en-US" dirty="0" smtClean="0"/>
               <a:t>1-Ventas-Vehiculo-Global.xlsx”</a:t>
             </a:r>
-            <a:endParaRPr lang="en-US" dirty="0" smtClean="0"/>
           </a:p>
           <a:p>
             <a:pPr lvl="1"/>
@@ -8310,9 +8496,10 @@
           <a:lstStyle/>
           <a:p>
             <a:r>
-              <a:rPr lang="es-ES_tradnl" dirty="0"/>
-              <a:t>Unión e Intersección de datos</a:t>
-            </a:r>
+              <a:rPr lang="es-ES_tradnl" dirty="0" smtClean="0"/>
+              <a:t>Exploración de Datos</a:t>
+            </a:r>
+            <a:endParaRPr lang="es-ES_tradnl" dirty="0"/>
           </a:p>
         </p:txBody>
       </p:sp>
@@ -8365,29 +8552,39 @@
               <a:rPr lang="en-US" dirty="0" smtClean="0"/>
               <a:t> “2-Corridas-10k.xlsx”</a:t>
             </a:r>
-            <a:endParaRPr lang="en-US" dirty="0" smtClean="0"/>
           </a:p>
           <a:p>
             <a:pPr lvl="1"/>
             <a:r>
               <a:rPr lang="en-US" dirty="0" err="1" smtClean="0"/>
-              <a:t>Unir</a:t>
+              <a:t>Separacion</a:t>
             </a:r>
             <a:r>
               <a:rPr lang="en-US" dirty="0" smtClean="0"/>
               <a:t> </a:t>
             </a:r>
             <a:r>
+              <a:rPr lang="en-US" dirty="0" smtClean="0"/>
+              <a:t>de </a:t>
+            </a:r>
+            <a:r>
               <a:rPr lang="en-US" dirty="0" err="1" smtClean="0"/>
-              <a:t>datos</a:t>
+              <a:t>campos</a:t>
             </a:r>
             <a:r>
               <a:rPr lang="en-US" dirty="0" smtClean="0"/>
-              <a:t> de </a:t>
-            </a:r>
+              <a:t> con </a:t>
+            </a:r>
+            <a:r>
+              <a:rPr lang="en-US" dirty="0" smtClean="0"/>
+              <a:t>/</a:t>
+            </a:r>
+          </a:p>
+          <a:p>
+            <a:pPr lvl="1"/>
             <a:r>
               <a:rPr lang="en-US" dirty="0" err="1" smtClean="0"/>
-              <a:t>distintas</a:t>
+              <a:t>Generar</a:t>
             </a:r>
             <a:r>
               <a:rPr lang="en-US" dirty="0" smtClean="0"/>
@@ -8395,67 +8592,37 @@
             </a:r>
             <a:r>
               <a:rPr lang="en-US" dirty="0" err="1" smtClean="0"/>
-              <a:t>hojas</a:t>
+              <a:t>nuevas</a:t>
             </a:r>
             <a:r>
               <a:rPr lang="en-US" dirty="0" smtClean="0"/>
-              <a:t> de excel</a:t>
-            </a:r>
-          </a:p>
-          <a:p>
-            <a:pPr lvl="1"/>
-            <a:r>
-              <a:rPr lang="en-US" dirty="0" smtClean="0"/>
-              <a:t>Resolver </a:t>
-            </a:r>
-            <a:r>
-              <a:rPr lang="en-US" dirty="0" err="1" smtClean="0"/>
-              <a:t>conflictos</a:t>
-            </a:r>
-            <a:r>
-              <a:rPr lang="en-US" dirty="0" smtClean="0"/>
-              <a:t> de </a:t>
+              <a:t> </a:t>
             </a:r>
             <a:r>
               <a:rPr lang="en-US" dirty="0" err="1" smtClean="0"/>
               <a:t>columnas</a:t>
             </a:r>
+            <a:r>
+              <a:rPr lang="en-US" dirty="0" smtClean="0"/>
+              <a:t> para </a:t>
+            </a:r>
+            <a:r>
+              <a:rPr lang="en-US" dirty="0" err="1" smtClean="0"/>
+              <a:t>nombre</a:t>
+            </a:r>
+            <a:r>
+              <a:rPr lang="en-US" dirty="0" smtClean="0"/>
+              <a:t> y </a:t>
+            </a:r>
+            <a:r>
+              <a:rPr lang="en-US" dirty="0" err="1" smtClean="0"/>
+              <a:t>apellido</a:t>
+            </a:r>
+            <a:r>
+              <a:rPr lang="en-US" dirty="0" smtClean="0"/>
+              <a:t>.</a:t>
+            </a:r>
             <a:endParaRPr lang="en-US" dirty="0" smtClean="0"/>
-          </a:p>
-          <a:p>
-            <a:pPr lvl="1"/>
-            <a:r>
-              <a:rPr lang="en-US" dirty="0" err="1" smtClean="0"/>
-              <a:t>Renombrar</a:t>
-            </a:r>
-            <a:r>
-              <a:rPr lang="en-US" dirty="0" smtClean="0"/>
-              <a:t> </a:t>
-            </a:r>
-            <a:r>
-              <a:rPr lang="en-US" dirty="0" err="1" smtClean="0"/>
-              <a:t>columnas</a:t>
-            </a:r>
-            <a:endParaRPr lang="en-US" dirty="0" smtClean="0"/>
-          </a:p>
-          <a:p>
-            <a:pPr lvl="1"/>
-            <a:r>
-              <a:rPr lang="en-US" dirty="0" err="1" smtClean="0"/>
-              <a:t>Separacion</a:t>
-            </a:r>
-            <a:r>
-              <a:rPr lang="en-US" dirty="0" smtClean="0"/>
-              <a:t> de </a:t>
-            </a:r>
-            <a:r>
-              <a:rPr lang="en-US" dirty="0" err="1" smtClean="0"/>
-              <a:t>campos</a:t>
-            </a:r>
-            <a:r>
-              <a:rPr lang="en-US" dirty="0" smtClean="0"/>
-              <a:t> con /</a:t>
-            </a:r>
           </a:p>
         </p:txBody>
       </p:sp>
@@ -8557,40 +8724,24 @@
           <a:p>
             <a:pPr lvl="1"/>
             <a:r>
-              <a:rPr lang="en-US" dirty="0" err="1"/>
+              <a:rPr lang="en-US" dirty="0" err="1" smtClean="0"/>
               <a:t>Utilizando</a:t>
             </a:r>
             <a:r>
+              <a:rPr lang="en-US" dirty="0" smtClean="0"/>
+              <a:t> </a:t>
+            </a:r>
+            <a:r>
+              <a:rPr lang="en-US" dirty="0" err="1" smtClean="0"/>
+              <a:t>archivo</a:t>
+            </a:r>
+            <a:r>
+              <a:rPr lang="en-US" dirty="0" smtClean="0"/>
+              <a:t> </a:t>
+            </a:r>
+            <a:r>
               <a:rPr lang="en-US" dirty="0"/>
-              <a:t> </a:t>
-            </a:r>
-            <a:r>
-              <a:rPr lang="en-US" dirty="0" err="1"/>
-              <a:t>archivo</a:t>
-            </a:r>
-            <a:r>
-              <a:rPr lang="en-US" dirty="0"/>
-              <a:t> “</a:t>
-            </a:r>
-            <a:r>
-              <a:rPr lang="en-US" dirty="0" err="1"/>
-              <a:t>SuperTienda.xls</a:t>
-            </a:r>
-            <a:r>
-              <a:rPr lang="en-US" dirty="0"/>
-              <a:t>” de </a:t>
-            </a:r>
-            <a:r>
-              <a:rPr lang="en-US" dirty="0" err="1"/>
-              <a:t>clase</a:t>
-            </a:r>
-            <a:r>
-              <a:rPr lang="en-US" dirty="0"/>
-              <a:t> </a:t>
-            </a:r>
-            <a:r>
-              <a:rPr lang="en-US" dirty="0" smtClean="0"/>
-              <a:t>1</a:t>
+              <a:t>“3-Clima.xlsx”</a:t>
             </a:r>
             <a:endParaRPr lang="en-US" dirty="0" smtClean="0"/>
           </a:p>
@@ -8601,76 +8752,76 @@
               <a:t>Unir</a:t>
             </a:r>
             <a:r>
-              <a:rPr lang="en-US" dirty="0"/>
-              <a:t> </a:t>
-            </a:r>
-            <a:r>
-              <a:rPr lang="en-US" dirty="0" smtClean="0"/>
-              <a:t>con join con el </a:t>
-            </a:r>
-            <a:r>
-              <a:rPr lang="en-US" dirty="0" err="1" smtClean="0"/>
-              <a:t>archivo</a:t>
-            </a:r>
-            <a:r>
-              <a:rPr lang="en-US" dirty="0"/>
-              <a:t> “4-US-Censo.xlsx”</a:t>
-            </a:r>
-            <a:endParaRPr lang="en-US" dirty="0" smtClean="0"/>
-          </a:p>
-          <a:p>
-            <a:pPr lvl="1"/>
-            <a:r>
-              <a:rPr lang="en-US" dirty="0" err="1" smtClean="0"/>
-              <a:t>Generar</a:t>
-            </a:r>
-            <a:r>
               <a:rPr lang="en-US" dirty="0" smtClean="0"/>
               <a:t> </a:t>
             </a:r>
             <a:r>
               <a:rPr lang="en-US" dirty="0" err="1" smtClean="0"/>
-              <a:t>grafico</a:t>
-            </a:r>
-            <a:r>
-              <a:rPr lang="en-US" dirty="0"/>
-              <a:t> </a:t>
+              <a:t>datos</a:t>
             </a:r>
             <a:r>
               <a:rPr lang="en-US" dirty="0" smtClean="0"/>
-              <a:t>“</a:t>
+              <a:t> de </a:t>
             </a:r>
             <a:r>
               <a:rPr lang="en-US" dirty="0" err="1" smtClean="0"/>
-              <a:t>ventas</a:t>
+              <a:t>distintas</a:t>
             </a:r>
             <a:r>
               <a:rPr lang="en-US" dirty="0" smtClean="0"/>
               <a:t> </a:t>
             </a:r>
             <a:r>
-              <a:rPr lang="en-US" dirty="0" err="1"/>
-              <a:t>por</a:t>
-            </a:r>
-            <a:r>
-              <a:rPr lang="en-US" dirty="0"/>
+              <a:rPr lang="en-US" dirty="0" err="1" smtClean="0"/>
+              <a:t>hojas</a:t>
+            </a:r>
+            <a:r>
+              <a:rPr lang="en-US" dirty="0" smtClean="0"/>
+              <a:t> de excel</a:t>
+            </a:r>
+          </a:p>
+          <a:p>
+            <a:pPr lvl="1"/>
+            <a:r>
+              <a:rPr lang="en-US" dirty="0" smtClean="0"/>
+              <a:t>Resolver </a:t>
+            </a:r>
+            <a:r>
+              <a:rPr lang="en-US" dirty="0" err="1" smtClean="0"/>
+              <a:t>conflictos</a:t>
+            </a:r>
+            <a:r>
+              <a:rPr lang="en-US" dirty="0" smtClean="0"/>
+              <a:t> de </a:t>
+            </a:r>
+            <a:r>
+              <a:rPr lang="en-US" dirty="0" err="1" smtClean="0"/>
+              <a:t>columnas</a:t>
+            </a:r>
+            <a:endParaRPr lang="en-US" dirty="0" smtClean="0"/>
+          </a:p>
+          <a:p>
+            <a:pPr lvl="1"/>
+            <a:r>
+              <a:rPr lang="en-US" dirty="0" err="1" smtClean="0"/>
+              <a:t>Renombrar</a:t>
+            </a:r>
+            <a:r>
+              <a:rPr lang="en-US" dirty="0" smtClean="0"/>
               <a:t> </a:t>
             </a:r>
             <a:r>
               <a:rPr lang="en-US" dirty="0" err="1" smtClean="0"/>
-              <a:t>estado</a:t>
-            </a:r>
-            <a:r>
-              <a:rPr lang="en-US" dirty="0" smtClean="0"/>
-              <a:t> per capita”</a:t>
-            </a:r>
+              <a:t>columnas</a:t>
+            </a:r>
+            <a:endParaRPr lang="en-US" dirty="0" smtClean="0"/>
           </a:p>
         </p:txBody>
       </p:sp>
     </p:spTree>
     <p:extLst>
       <p:ext uri="{BB962C8B-B14F-4D97-AF65-F5344CB8AC3E}">
-        <p14:creationId xmlns:p14="http://schemas.microsoft.com/office/powerpoint/2010/main" val="828620787"/>
+        <p14:creationId xmlns:p14="http://schemas.microsoft.com/office/powerpoint/2010/main" val="1628429741"/>
       </p:ext>
     </p:extLst>
   </p:cSld>
@@ -8721,20 +8872,13 @@
           </a:xfrm>
         </p:spPr>
         <p:txBody>
-          <a:bodyPr>
-            <a:normAutofit/>
-          </a:bodyPr>
+          <a:bodyPr/>
           <a:lstStyle/>
           <a:p>
             <a:r>
               <a:rPr lang="es-ES_tradnl" dirty="0"/>
-              <a:t>Tablas </a:t>
-            </a:r>
-            <a:r>
-              <a:rPr lang="es-ES_tradnl" dirty="0" err="1" smtClean="0"/>
-              <a:t>Pivot</a:t>
-            </a:r>
-            <a:endParaRPr lang="es-ES_tradnl" dirty="0"/>
+              <a:t>Unión e Intersección de datos</a:t>
+            </a:r>
           </a:p>
         </p:txBody>
       </p:sp>
@@ -8785,11 +8929,50 @@
             </a:r>
             <a:r>
               <a:rPr lang="en-US" dirty="0"/>
-              <a:t> “1-Ventas-Vehiculo-Global.xlsx</a:t>
+              <a:t> “</a:t>
+            </a:r>
+            <a:r>
+              <a:rPr lang="en-US" dirty="0" err="1"/>
+              <a:t>SuperTienda.xls</a:t>
+            </a:r>
+            <a:r>
+              <a:rPr lang="en-US" dirty="0"/>
+              <a:t>” de </a:t>
+            </a:r>
+            <a:r>
+              <a:rPr lang="en-US" dirty="0" err="1"/>
+              <a:t>clase</a:t>
+            </a:r>
+            <a:r>
+              <a:rPr lang="en-US" dirty="0"/>
+              <a:t> </a:t>
             </a:r>
             <a:r>
               <a:rPr lang="en-US" dirty="0" smtClean="0"/>
-              <a:t>”</a:t>
+              <a:t>1</a:t>
+            </a:r>
+          </a:p>
+          <a:p>
+            <a:pPr lvl="1"/>
+            <a:r>
+              <a:rPr lang="en-US" dirty="0" err="1" smtClean="0"/>
+              <a:t>Unir</a:t>
+            </a:r>
+            <a:r>
+              <a:rPr lang="en-US" dirty="0"/>
+              <a:t> </a:t>
+            </a:r>
+            <a:r>
+              <a:rPr lang="en-US" dirty="0" smtClean="0"/>
+              <a:t>con join con el </a:t>
+            </a:r>
+            <a:r>
+              <a:rPr lang="en-US" dirty="0" err="1" smtClean="0"/>
+              <a:t>archivo</a:t>
+            </a:r>
+            <a:r>
+              <a:rPr lang="en-US" dirty="0"/>
+              <a:t> “4-US-Censo.xlsx”</a:t>
             </a:r>
             <a:endParaRPr lang="en-US" dirty="0" smtClean="0"/>
           </a:p>
@@ -8797,15 +8980,7 @@
             <a:pPr lvl="1"/>
             <a:r>
               <a:rPr lang="en-US" dirty="0" err="1" smtClean="0"/>
-              <a:t>Pivotear</a:t>
-            </a:r>
-            <a:r>
-              <a:rPr lang="en-US" dirty="0" smtClean="0"/>
-              <a:t> los </a:t>
-            </a:r>
-            <a:r>
-              <a:rPr lang="en-US" dirty="0" err="1" smtClean="0"/>
-              <a:t>datos</a:t>
+              <a:t>Generar</a:t>
             </a:r>
             <a:r>
               <a:rPr lang="en-US" dirty="0" smtClean="0"/>
@@ -8813,87 +8988,39 @@
             </a:r>
             <a:r>
               <a:rPr lang="en-US" dirty="0" err="1" smtClean="0"/>
-              <a:t>por</a:t>
+              <a:t>grafico</a:t>
+            </a:r>
+            <a:r>
+              <a:rPr lang="en-US" dirty="0"/>
+              <a:t> </a:t>
+            </a:r>
+            <a:r>
+              <a:rPr lang="en-US" dirty="0" smtClean="0"/>
+              <a:t>“</a:t>
+            </a:r>
+            <a:r>
+              <a:rPr lang="en-US" dirty="0" err="1" smtClean="0"/>
+              <a:t>ventas</a:t>
             </a:r>
             <a:r>
               <a:rPr lang="en-US" dirty="0" smtClean="0"/>
               <a:t> </a:t>
             </a:r>
             <a:r>
-              <a:rPr lang="en-US" dirty="0" err="1" smtClean="0"/>
-              <a:t>a</a:t>
-            </a:r>
-            <a:r>
-              <a:rPr lang="en-US" dirty="0" err="1" smtClean="0"/>
-              <a:t>ño</a:t>
-            </a:r>
-            <a:endParaRPr lang="en-US" dirty="0" smtClean="0"/>
-          </a:p>
-          <a:p>
-            <a:pPr lvl="1"/>
-            <a:r>
-              <a:rPr lang="en-US" dirty="0" err="1" smtClean="0"/>
-              <a:t>Generar</a:t>
-            </a:r>
-            <a:r>
-              <a:rPr lang="en-US" dirty="0" smtClean="0"/>
-              <a:t> </a:t>
-            </a:r>
-            <a:r>
-              <a:rPr lang="en-US" dirty="0" err="1" smtClean="0"/>
-              <a:t>grafico</a:t>
+              <a:rPr lang="en-US" dirty="0" err="1"/>
+              <a:t>por</a:t>
             </a:r>
             <a:r>
               <a:rPr lang="en-US" dirty="0"/>
               <a:t> </a:t>
             </a:r>
             <a:r>
+              <a:rPr lang="en-US" dirty="0" err="1" smtClean="0"/>
+              <a:t>estado</a:t>
+            </a:r>
+            <a:r>
               <a:rPr lang="en-US" dirty="0" smtClean="0"/>
-              <a:t>“</a:t>
-            </a:r>
-            <a:r>
-              <a:rPr lang="en-US" dirty="0" err="1" smtClean="0"/>
-              <a:t>ventas</a:t>
-            </a:r>
-            <a:r>
-              <a:rPr lang="en-US" dirty="0" smtClean="0"/>
-              <a:t> </a:t>
-            </a:r>
-            <a:r>
-              <a:rPr lang="en-US" dirty="0" err="1" smtClean="0"/>
-              <a:t>por</a:t>
-            </a:r>
-            <a:r>
-              <a:rPr lang="en-US" dirty="0" smtClean="0"/>
-              <a:t> </a:t>
-            </a:r>
-            <a:r>
-              <a:rPr lang="en-US" dirty="0" err="1" smtClean="0"/>
-              <a:t>pais</a:t>
-            </a:r>
-            <a:r>
-              <a:rPr lang="en-US" dirty="0" smtClean="0"/>
-              <a:t> </a:t>
-            </a:r>
-            <a:r>
-              <a:rPr lang="en-US" dirty="0" err="1" smtClean="0"/>
-              <a:t>por</a:t>
-            </a:r>
-            <a:r>
-              <a:rPr lang="en-US" dirty="0" smtClean="0"/>
-              <a:t> </a:t>
-            </a:r>
-            <a:r>
-              <a:rPr lang="en-US" dirty="0" err="1" smtClean="0"/>
-              <a:t>a</a:t>
-            </a:r>
-            <a:r>
-              <a:rPr lang="en-US" dirty="0" err="1" smtClean="0"/>
-              <a:t>ño</a:t>
-            </a:r>
-            <a:r>
-              <a:rPr lang="en-US" dirty="0" smtClean="0"/>
-              <a:t>”</a:t>
+              <a:t> per capita”</a:t>
             </a:r>
           </a:p>
         </p:txBody>
@@ -8901,7 +9028,7 @@
     </p:spTree>
     <p:extLst>
       <p:ext uri="{BB962C8B-B14F-4D97-AF65-F5344CB8AC3E}">
-        <p14:creationId xmlns:p14="http://schemas.microsoft.com/office/powerpoint/2010/main" val="984879731"/>
+        <p14:creationId xmlns:p14="http://schemas.microsoft.com/office/powerpoint/2010/main" val="828620787"/>
       </p:ext>
     </p:extLst>
   </p:cSld>
@@ -8958,8 +9085,12 @@
           <a:lstStyle/>
           <a:p>
             <a:r>
-              <a:rPr lang="es-ES_tradnl" dirty="0" smtClean="0"/>
-              <a:t>Ejercicio</a:t>
+              <a:rPr lang="es-ES_tradnl" dirty="0"/>
+              <a:t>Tablas </a:t>
+            </a:r>
+            <a:r>
+              <a:rPr lang="es-ES_tradnl" dirty="0" err="1" smtClean="0"/>
+              <a:t>Pivot</a:t>
             </a:r>
             <a:endParaRPr lang="es-ES_tradnl" dirty="0"/>
           </a:p>
@@ -9012,7 +9143,42 @@
             </a:r>
             <a:r>
               <a:rPr lang="en-US" dirty="0"/>
-              <a:t> “5-Ventas-Cuatrimestre.xlsx”</a:t>
+              <a:t> “1-Ventas-Vehiculo-Global.xlsx</a:t>
+            </a:r>
+            <a:r>
+              <a:rPr lang="en-US" dirty="0" smtClean="0"/>
+              <a:t>”</a:t>
+            </a:r>
+          </a:p>
+          <a:p>
+            <a:pPr lvl="1"/>
+            <a:r>
+              <a:rPr lang="en-US" dirty="0" err="1" smtClean="0"/>
+              <a:t>Pivotear</a:t>
+            </a:r>
+            <a:r>
+              <a:rPr lang="en-US" dirty="0" smtClean="0"/>
+              <a:t> los </a:t>
+            </a:r>
+            <a:r>
+              <a:rPr lang="en-US" dirty="0" err="1" smtClean="0"/>
+              <a:t>datos</a:t>
+            </a:r>
+            <a:r>
+              <a:rPr lang="en-US" dirty="0" smtClean="0"/>
+              <a:t> </a:t>
+            </a:r>
+            <a:r>
+              <a:rPr lang="en-US" dirty="0" err="1" smtClean="0"/>
+              <a:t>por</a:t>
+            </a:r>
+            <a:r>
+              <a:rPr lang="en-US" dirty="0" smtClean="0"/>
+              <a:t> </a:t>
+            </a:r>
+            <a:r>
+              <a:rPr lang="en-US" dirty="0" err="1" smtClean="0"/>
+              <a:t>año</a:t>
             </a:r>
             <a:endParaRPr lang="en-US" dirty="0" smtClean="0"/>
           </a:p>
@@ -9024,27 +9190,23 @@
             </a:r>
             <a:r>
               <a:rPr lang="en-US" dirty="0" smtClean="0"/>
-              <a:t> un </a:t>
+              <a:t> </a:t>
             </a:r>
             <a:r>
               <a:rPr lang="en-US" dirty="0" err="1" smtClean="0"/>
               <a:t>grafico</a:t>
             </a:r>
             <a:r>
+              <a:rPr lang="en-US" dirty="0"/>
+              <a:t> </a:t>
+            </a:r>
+            <a:r>
               <a:rPr lang="en-US" dirty="0" smtClean="0"/>
-              <a:t> de </a:t>
+              <a:t>“</a:t>
             </a:r>
             <a:r>
               <a:rPr lang="en-US" dirty="0" err="1" smtClean="0"/>
-              <a:t>barras</a:t>
-            </a:r>
-            <a:r>
-              <a:rPr lang="en-US" dirty="0" smtClean="0"/>
-              <a:t> con multiples </a:t>
-            </a:r>
-            <a:r>
-              <a:rPr lang="en-US" dirty="0" err="1" smtClean="0"/>
-              <a:t>colores</a:t>
+              <a:t>ventas</a:t>
             </a:r>
             <a:r>
               <a:rPr lang="en-US" dirty="0" smtClean="0"/>
@@ -9060,19 +9222,7 @@
             </a:r>
             <a:r>
               <a:rPr lang="en-US" dirty="0" err="1" smtClean="0"/>
-              <a:t>compa</a:t>
-            </a:r>
-            <a:r>
-              <a:rPr lang="en-US" dirty="0" err="1" smtClean="0"/>
-              <a:t>ñia</a:t>
-            </a:r>
-            <a:r>
-              <a:rPr lang="en-US" dirty="0" smtClean="0"/>
-              <a:t> y </a:t>
-            </a:r>
-            <a:r>
-              <a:rPr lang="en-US" dirty="0" err="1" smtClean="0"/>
-              <a:t>que</a:t>
+              <a:t>pais</a:t>
             </a:r>
             <a:r>
               <a:rPr lang="en-US" dirty="0" smtClean="0"/>
@@ -9080,7 +9230,7 @@
             </a:r>
             <a:r>
               <a:rPr lang="en-US" dirty="0" err="1" smtClean="0"/>
-              <a:t>muestre</a:t>
+              <a:t>por</a:t>
             </a:r>
             <a:r>
               <a:rPr lang="en-US" dirty="0" smtClean="0"/>
@@ -9088,84 +9238,19 @@
             </a:r>
             <a:r>
               <a:rPr lang="en-US" dirty="0" err="1" smtClean="0"/>
-              <a:t>las</a:t>
+              <a:t>año</a:t>
             </a:r>
             <a:r>
               <a:rPr lang="en-US" dirty="0" smtClean="0"/>
-              <a:t> </a:t>
-            </a:r>
-            <a:r>
-              <a:rPr lang="en-US" dirty="0" err="1" smtClean="0"/>
-              <a:t>ventas</a:t>
-            </a:r>
-            <a:r>
-              <a:rPr lang="en-US" dirty="0" smtClean="0"/>
-              <a:t> </a:t>
-            </a:r>
-            <a:r>
-              <a:rPr lang="en-US" dirty="0" err="1" smtClean="0"/>
-              <a:t>por</a:t>
-            </a:r>
-            <a:r>
-              <a:rPr lang="en-US" dirty="0" smtClean="0"/>
-              <a:t> </a:t>
-            </a:r>
-            <a:r>
-              <a:rPr lang="en-US" dirty="0" err="1" smtClean="0"/>
-              <a:t>Cuatrimestre</a:t>
-            </a:r>
-            <a:r>
-              <a:rPr lang="en-US" dirty="0" smtClean="0"/>
-              <a:t> en </a:t>
-            </a:r>
-            <a:r>
-              <a:rPr lang="en-US" dirty="0" err="1" smtClean="0"/>
-              <a:t>columnas</a:t>
-            </a:r>
-            <a:r>
-              <a:rPr lang="en-US" dirty="0" smtClean="0"/>
-              <a:t> y </a:t>
-            </a:r>
-            <a:r>
-              <a:rPr lang="en-US" dirty="0" err="1" smtClean="0"/>
-              <a:t>las</a:t>
-            </a:r>
-            <a:r>
-              <a:rPr lang="en-US" dirty="0" smtClean="0"/>
-              <a:t> </a:t>
-            </a:r>
-            <a:r>
-              <a:rPr lang="en-US" dirty="0" err="1" smtClean="0"/>
-              <a:t>ventas</a:t>
-            </a:r>
-            <a:r>
-              <a:rPr lang="en-US" dirty="0" smtClean="0"/>
-              <a:t> </a:t>
-            </a:r>
-            <a:r>
-              <a:rPr lang="en-US" dirty="0" err="1" smtClean="0"/>
-              <a:t>como</a:t>
-            </a:r>
-            <a:r>
-              <a:rPr lang="en-US" dirty="0" smtClean="0"/>
-              <a:t> </a:t>
-            </a:r>
-            <a:r>
-              <a:rPr lang="en-US" dirty="0" err="1" smtClean="0"/>
-              <a:t>valores</a:t>
-            </a:r>
-            <a:r>
-              <a:rPr lang="en-US" dirty="0" smtClean="0"/>
-              <a:t>.</a:t>
-            </a:r>
-            <a:endParaRPr lang="en-US" dirty="0" smtClean="0"/>
+              <a:t>”</a:t>
+            </a:r>
           </a:p>
         </p:txBody>
       </p:sp>
     </p:spTree>
     <p:extLst>
       <p:ext uri="{BB962C8B-B14F-4D97-AF65-F5344CB8AC3E}">
-        <p14:creationId xmlns:p14="http://schemas.microsoft.com/office/powerpoint/2010/main" val="1213470280"/>
+        <p14:creationId xmlns:p14="http://schemas.microsoft.com/office/powerpoint/2010/main" val="984879731"/>
       </p:ext>
     </p:extLst>
   </p:cSld>
@@ -9229,39 +9314,202 @@
           </a:p>
         </p:txBody>
       </p:sp>
-      <p:pic>
-        <p:nvPicPr>
-          <p:cNvPr id="6" name="Marcador de contenido 5"/>
-          <p:cNvPicPr>
-            <a:picLocks noGrp="1" noChangeAspect="1"/>
-          </p:cNvPicPr>
+      <p:sp>
+        <p:nvSpPr>
+          <p:cNvPr id="3" name="Marcador de contenido 2"/>
+          <p:cNvSpPr>
+            <a:spLocks noGrp="1"/>
+          </p:cNvSpPr>
           <p:nvPr>
             <p:ph idx="1"/>
           </p:nvPr>
-        </p:nvPicPr>
-        <p:blipFill>
-          <a:blip r:embed="rId3">
-            <a:extLst>
-              <a:ext uri="{28A0092B-C50C-407E-A947-70E740481C1C}">
-                <a14:useLocalDpi xmlns:a14="http://schemas.microsoft.com/office/drawing/2010/main" val="0"/>
-              </a:ext>
-            </a:extLst>
-          </a:blip>
-          <a:stretch>
-            <a:fillRect/>
-          </a:stretch>
-        </p:blipFill>
+        </p:nvSpPr>
         <p:spPr>
           <a:xfrm>
-            <a:off x="3259015" y="1630425"/>
-            <a:ext cx="6283569" cy="5048129"/>
+            <a:off x="1484310" y="1500555"/>
+            <a:ext cx="10018713" cy="4829907"/>
           </a:xfrm>
         </p:spPr>
-      </p:pic>
+        <p:txBody>
+          <a:bodyPr>
+            <a:normAutofit/>
+          </a:bodyPr>
+          <a:lstStyle/>
+          <a:p>
+            <a:r>
+              <a:rPr lang="en-US" dirty="0" err="1" smtClean="0"/>
+              <a:t>Objetivos</a:t>
+            </a:r>
+            <a:r>
+              <a:rPr lang="en-US" dirty="0" smtClean="0"/>
+              <a:t>:</a:t>
+            </a:r>
+          </a:p>
+          <a:p>
+            <a:pPr lvl="1"/>
+            <a:r>
+              <a:rPr lang="en-US" dirty="0" err="1"/>
+              <a:t>Utilizando</a:t>
+            </a:r>
+            <a:r>
+              <a:rPr lang="en-US" dirty="0"/>
+              <a:t> </a:t>
+            </a:r>
+            <a:r>
+              <a:rPr lang="en-US" dirty="0" err="1"/>
+              <a:t>archivo</a:t>
+            </a:r>
+            <a:r>
+              <a:rPr lang="en-US" dirty="0"/>
+              <a:t> “5-Ventas-Cuatrimestre.xlsx”</a:t>
+            </a:r>
+            <a:endParaRPr lang="en-US" dirty="0" smtClean="0"/>
+          </a:p>
+          <a:p>
+            <a:pPr lvl="1"/>
+            <a:r>
+              <a:rPr lang="en-US" dirty="0" err="1" smtClean="0"/>
+              <a:t>Generar</a:t>
+            </a:r>
+            <a:r>
+              <a:rPr lang="en-US" dirty="0" smtClean="0"/>
+              <a:t> un </a:t>
+            </a:r>
+            <a:r>
+              <a:rPr lang="en-US" dirty="0" err="1" smtClean="0"/>
+              <a:t>grafico</a:t>
+            </a:r>
+            <a:r>
+              <a:rPr lang="en-US" dirty="0" smtClean="0"/>
+              <a:t> de </a:t>
+            </a:r>
+            <a:r>
+              <a:rPr lang="en-US" dirty="0" err="1" smtClean="0"/>
+              <a:t>barras</a:t>
+            </a:r>
+            <a:r>
+              <a:rPr lang="en-US" dirty="0" smtClean="0"/>
+              <a:t> con multiples </a:t>
+            </a:r>
+            <a:r>
+              <a:rPr lang="en-US" dirty="0" err="1" smtClean="0"/>
+              <a:t>colores</a:t>
+            </a:r>
+            <a:r>
+              <a:rPr lang="en-US" dirty="0" smtClean="0"/>
+              <a:t> </a:t>
+            </a:r>
+            <a:r>
+              <a:rPr lang="en-US" dirty="0" err="1" smtClean="0"/>
+              <a:t>por</a:t>
+            </a:r>
+            <a:r>
+              <a:rPr lang="en-US" dirty="0" smtClean="0"/>
+              <a:t> </a:t>
+            </a:r>
+            <a:r>
+              <a:rPr lang="en-US" dirty="0" err="1" smtClean="0"/>
+              <a:t>compañia</a:t>
+            </a:r>
+            <a:r>
+              <a:rPr lang="en-US" dirty="0" smtClean="0"/>
+              <a:t> y </a:t>
+            </a:r>
+            <a:r>
+              <a:rPr lang="en-US" dirty="0" err="1" smtClean="0"/>
+              <a:t>que</a:t>
+            </a:r>
+            <a:r>
+              <a:rPr lang="en-US" dirty="0" smtClean="0"/>
+              <a:t> </a:t>
+            </a:r>
+            <a:r>
+              <a:rPr lang="en-US" dirty="0" err="1" smtClean="0"/>
+              <a:t>muestre</a:t>
+            </a:r>
+            <a:r>
+              <a:rPr lang="en-US" dirty="0" smtClean="0"/>
+              <a:t> </a:t>
+            </a:r>
+            <a:r>
+              <a:rPr lang="en-US" dirty="0" err="1" smtClean="0"/>
+              <a:t>las</a:t>
+            </a:r>
+            <a:r>
+              <a:rPr lang="en-US" dirty="0" smtClean="0"/>
+              <a:t> </a:t>
+            </a:r>
+            <a:r>
+              <a:rPr lang="en-US" dirty="0" err="1" smtClean="0"/>
+              <a:t>ventas</a:t>
+            </a:r>
+            <a:r>
+              <a:rPr lang="en-US" dirty="0" smtClean="0"/>
+              <a:t> </a:t>
+            </a:r>
+            <a:r>
+              <a:rPr lang="en-US" dirty="0" err="1" smtClean="0"/>
+              <a:t>por</a:t>
+            </a:r>
+            <a:r>
+              <a:rPr lang="en-US" dirty="0" smtClean="0"/>
+              <a:t> </a:t>
+            </a:r>
+            <a:r>
+              <a:rPr lang="en-US" dirty="0" err="1" smtClean="0"/>
+              <a:t>Cuatrimestre</a:t>
+            </a:r>
+            <a:r>
+              <a:rPr lang="en-US" dirty="0" smtClean="0"/>
+              <a:t> en </a:t>
+            </a:r>
+            <a:r>
+              <a:rPr lang="en-US" dirty="0" err="1" smtClean="0"/>
+              <a:t>columnas</a:t>
+            </a:r>
+            <a:r>
+              <a:rPr lang="en-US" dirty="0" smtClean="0"/>
+              <a:t> y </a:t>
+            </a:r>
+            <a:r>
+              <a:rPr lang="en-US" dirty="0" err="1" smtClean="0"/>
+              <a:t>las</a:t>
+            </a:r>
+            <a:r>
+              <a:rPr lang="en-US" dirty="0" smtClean="0"/>
+              <a:t> </a:t>
+            </a:r>
+            <a:r>
+              <a:rPr lang="en-US" dirty="0" err="1" smtClean="0"/>
+              <a:t>ventas</a:t>
+            </a:r>
+            <a:r>
+              <a:rPr lang="en-US" dirty="0" smtClean="0"/>
+              <a:t> </a:t>
+            </a:r>
+            <a:r>
+              <a:rPr lang="en-US" dirty="0" err="1" smtClean="0"/>
+              <a:t>como</a:t>
+            </a:r>
+            <a:r>
+              <a:rPr lang="en-US" dirty="0" smtClean="0"/>
+              <a:t> </a:t>
+            </a:r>
+            <a:r>
+              <a:rPr lang="en-US" dirty="0" err="1" smtClean="0"/>
+              <a:t>valores</a:t>
+            </a:r>
+            <a:r>
+              <a:rPr lang="en-US" dirty="0" smtClean="0"/>
+              <a:t>.</a:t>
+            </a:r>
+          </a:p>
+        </p:txBody>
+      </p:sp>
     </p:spTree>
     <p:extLst>
       <p:ext uri="{BB962C8B-B14F-4D97-AF65-F5344CB8AC3E}">
-        <p14:creationId xmlns:p14="http://schemas.microsoft.com/office/powerpoint/2010/main" val="1773686736"/>
+        <p14:creationId xmlns:p14="http://schemas.microsoft.com/office/powerpoint/2010/main" val="1213470280"/>
       </p:ext>
     </p:extLst>
   </p:cSld>

</xml_diff>